<commit_message>
Add more explanation about clone/push/pull
TODO: Make a chart comparing clone/pull
</commit_message>
<xml_diff>
--- a/Source Control/1. Intro to Git.pptx
+++ b/Source Control/1. Intro to Git.pptx
@@ -15,8 +15,12 @@
     <p:sldId id="263" r:id="rId9"/>
     <p:sldId id="264" r:id="rId10"/>
     <p:sldId id="265" r:id="rId11"/>
-    <p:sldId id="266" r:id="rId12"/>
-    <p:sldId id="267" r:id="rId13"/>
+    <p:sldId id="268" r:id="rId12"/>
+    <p:sldId id="269" r:id="rId13"/>
+    <p:sldId id="266" r:id="rId14"/>
+    <p:sldId id="270" r:id="rId15"/>
+    <p:sldId id="267" r:id="rId16"/>
+    <p:sldId id="271" r:id="rId17"/>
   </p:sldIdLst>
   <p:sldSz cx="12192000" cy="6858000"/>
   <p:notesSz cx="6858000" cy="9144000"/>
@@ -348,7 +352,7 @@
             <a:fld id="{5586B75A-687E-405C-8A0B-8D00578BA2C3}" type="datetimeFigureOut">
               <a:rPr lang="en-US" dirty="0"/>
               <a:pPr/>
-              <a:t>7/12/19</a:t>
+              <a:t>7/13/19</a:t>
             </a:fld>
             <a:endParaRPr lang="en-US" dirty="0"/>
           </a:p>
@@ -515,7 +519,7 @@
             <a:fld id="{5586B75A-687E-405C-8A0B-8D00578BA2C3}" type="datetimeFigureOut">
               <a:rPr lang="en-US" dirty="0"/>
               <a:pPr/>
-              <a:t>7/12/19</a:t>
+              <a:t>7/13/19</a:t>
             </a:fld>
             <a:endParaRPr lang="en-US" dirty="0"/>
           </a:p>
@@ -692,7 +696,7 @@
             <a:fld id="{5586B75A-687E-405C-8A0B-8D00578BA2C3}" type="datetimeFigureOut">
               <a:rPr lang="en-US" dirty="0"/>
               <a:pPr/>
-              <a:t>7/12/19</a:t>
+              <a:t>7/13/19</a:t>
             </a:fld>
             <a:endParaRPr lang="en-US" dirty="0"/>
           </a:p>
@@ -859,7 +863,7 @@
             <a:fld id="{5586B75A-687E-405C-8A0B-8D00578BA2C3}" type="datetimeFigureOut">
               <a:rPr lang="en-US" dirty="0"/>
               <a:pPr/>
-              <a:t>7/12/19</a:t>
+              <a:t>7/13/19</a:t>
             </a:fld>
             <a:endParaRPr lang="en-US" dirty="0"/>
           </a:p>
@@ -1114,7 +1118,7 @@
             <a:fld id="{5586B75A-687E-405C-8A0B-8D00578BA2C3}" type="datetimeFigureOut">
               <a:rPr lang="en-US" dirty="0"/>
               <a:pPr/>
-              <a:t>7/12/19</a:t>
+              <a:t>7/13/19</a:t>
             </a:fld>
             <a:endParaRPr lang="en-US" dirty="0"/>
           </a:p>
@@ -1399,7 +1403,7 @@
             <a:fld id="{5586B75A-687E-405C-8A0B-8D00578BA2C3}" type="datetimeFigureOut">
               <a:rPr lang="en-US" dirty="0"/>
               <a:pPr/>
-              <a:t>7/12/19</a:t>
+              <a:t>7/13/19</a:t>
             </a:fld>
             <a:endParaRPr lang="en-US" dirty="0"/>
           </a:p>
@@ -1838,7 +1842,7 @@
             <a:fld id="{5586B75A-687E-405C-8A0B-8D00578BA2C3}" type="datetimeFigureOut">
               <a:rPr lang="en-US" dirty="0"/>
               <a:pPr/>
-              <a:t>7/12/19</a:t>
+              <a:t>7/13/19</a:t>
             </a:fld>
             <a:endParaRPr lang="en-US" dirty="0"/>
           </a:p>
@@ -1953,7 +1957,7 @@
             <a:fld id="{5586B75A-687E-405C-8A0B-8D00578BA2C3}" type="datetimeFigureOut">
               <a:rPr lang="en-US" dirty="0"/>
               <a:pPr/>
-              <a:t>7/12/19</a:t>
+              <a:t>7/13/19</a:t>
             </a:fld>
             <a:endParaRPr lang="en-US" dirty="0"/>
           </a:p>
@@ -2045,7 +2049,7 @@
             <a:fld id="{5586B75A-687E-405C-8A0B-8D00578BA2C3}" type="datetimeFigureOut">
               <a:rPr lang="en-US" dirty="0"/>
               <a:pPr/>
-              <a:t>7/12/19</a:t>
+              <a:t>7/13/19</a:t>
             </a:fld>
             <a:endParaRPr lang="en-US" dirty="0"/>
           </a:p>
@@ -2330,7 +2334,7 @@
             <a:fld id="{5586B75A-687E-405C-8A0B-8D00578BA2C3}" type="datetimeFigureOut">
               <a:rPr lang="en-US" dirty="0"/>
               <a:pPr/>
-              <a:t>7/12/19</a:t>
+              <a:t>7/13/19</a:t>
             </a:fld>
             <a:endParaRPr lang="en-US" dirty="0"/>
           </a:p>
@@ -2600,7 +2604,7 @@
             <a:fld id="{5586B75A-687E-405C-8A0B-8D00578BA2C3}" type="datetimeFigureOut">
               <a:rPr lang="en-US" dirty="0"/>
               <a:pPr/>
-              <a:t>7/12/19</a:t>
+              <a:t>7/13/19</a:t>
             </a:fld>
             <a:endParaRPr lang="en-US" dirty="0"/>
           </a:p>
@@ -2894,7 +2898,7 @@
             <a:fld id="{5586B75A-687E-405C-8A0B-8D00578BA2C3}" type="datetimeFigureOut">
               <a:rPr lang="en-US" dirty="0"/>
               <a:pPr/>
-              <a:t>7/12/19</a:t>
+              <a:t>7/13/19</a:t>
             </a:fld>
             <a:endParaRPr lang="en-US" dirty="0"/>
           </a:p>
@@ -3733,9 +3737,7 @@
           <a:prstGeom prst="rect">
             <a:avLst/>
           </a:prstGeom>
-          <a:solidFill>
-            <a:schemeClr val="bg1"/>
-          </a:solidFill>
+          <a:noFill/>
         </p:spPr>
         <p:txBody>
           <a:bodyPr wrap="square" rtlCol="0">
@@ -3750,6 +3752,94 @@
                 </a:solidFill>
               </a:rPr>
               <a:t>Communication</a:t>
+            </a:r>
+            <a:endParaRPr kumimoji="1" lang="ko-KR" altLang="en-US" sz="4000" b="1" dirty="0">
+              <a:solidFill>
+                <a:srgbClr val="3FBAD2"/>
+              </a:solidFill>
+            </a:endParaRPr>
+          </a:p>
+        </p:txBody>
+      </p:sp>
+      <p:sp>
+        <p:nvSpPr>
+          <p:cNvPr id="7" name="TextBox 6">
+            <a:extLst>
+              <a:ext uri="{FF2B5EF4-FFF2-40B4-BE49-F238E27FC236}">
+                <a16:creationId xmlns:a16="http://schemas.microsoft.com/office/drawing/2014/main" id="{AEF3623B-81FA-C04B-8DAB-CE7139ACD726}"/>
+              </a:ext>
+            </a:extLst>
+          </p:cNvPr>
+          <p:cNvSpPr txBox="1"/>
+          <p:nvPr/>
+        </p:nvSpPr>
+        <p:spPr>
+          <a:xfrm>
+            <a:off x="3717180" y="769894"/>
+            <a:ext cx="2947482" cy="707886"/>
+          </a:xfrm>
+          <a:prstGeom prst="rect">
+            <a:avLst/>
+          </a:prstGeom>
+          <a:noFill/>
+        </p:spPr>
+        <p:txBody>
+          <a:bodyPr wrap="square" rtlCol="0">
+            <a:spAutoFit/>
+          </a:bodyPr>
+          <a:lstStyle/>
+          <a:p>
+            <a:r>
+              <a:rPr kumimoji="1" lang="en-US" altLang="ko-KR" sz="4000" b="1" dirty="0">
+                <a:solidFill>
+                  <a:srgbClr val="3FBAD2"/>
+                </a:solidFill>
+              </a:rPr>
+              <a:t>Server Repo</a:t>
+            </a:r>
+            <a:endParaRPr kumimoji="1" lang="ko-KR" altLang="en-US" sz="4000" b="1" dirty="0">
+              <a:solidFill>
+                <a:srgbClr val="3FBAD2"/>
+              </a:solidFill>
+            </a:endParaRPr>
+          </a:p>
+        </p:txBody>
+      </p:sp>
+      <p:sp>
+        <p:nvSpPr>
+          <p:cNvPr id="9" name="TextBox 8">
+            <a:extLst>
+              <a:ext uri="{FF2B5EF4-FFF2-40B4-BE49-F238E27FC236}">
+                <a16:creationId xmlns:a16="http://schemas.microsoft.com/office/drawing/2014/main" id="{0B407AA1-84DF-C148-9EAD-13C5C0DCA771}"/>
+              </a:ext>
+            </a:extLst>
+          </p:cNvPr>
+          <p:cNvSpPr txBox="1"/>
+          <p:nvPr/>
+        </p:nvSpPr>
+        <p:spPr>
+          <a:xfrm>
+            <a:off x="3717180" y="5245505"/>
+            <a:ext cx="2692701" cy="707886"/>
+          </a:xfrm>
+          <a:prstGeom prst="rect">
+            <a:avLst/>
+          </a:prstGeom>
+          <a:noFill/>
+        </p:spPr>
+        <p:txBody>
+          <a:bodyPr wrap="square" rtlCol="0">
+            <a:spAutoFit/>
+          </a:bodyPr>
+          <a:lstStyle/>
+          <a:p>
+            <a:r>
+              <a:rPr kumimoji="1" lang="en-US" altLang="ko-KR" sz="4000" b="1" dirty="0">
+                <a:solidFill>
+                  <a:srgbClr val="3FBAD2"/>
+                </a:solidFill>
+              </a:rPr>
+              <a:t>Local Repo</a:t>
             </a:r>
             <a:endParaRPr kumimoji="1" lang="ko-KR" altLang="en-US" sz="4000" b="1" dirty="0">
               <a:solidFill>
@@ -3856,45 +3946,9 @@
         </p:blipFill>
         <p:spPr>
           <a:xfrm>
-            <a:off x="6096000" y="167889"/>
+            <a:off x="6096000" y="736300"/>
             <a:ext cx="2692700" cy="2692700"/>
           </a:xfrm>
-        </p:spPr>
-      </p:pic>
-      <p:pic>
-        <p:nvPicPr>
-          <p:cNvPr id="10" name="그래픽 9" descr="컴퓨터">
-            <a:extLst>
-              <a:ext uri="{FF2B5EF4-FFF2-40B4-BE49-F238E27FC236}">
-                <a16:creationId xmlns:a16="http://schemas.microsoft.com/office/drawing/2014/main" id="{A39FA564-6661-E044-A2CB-5D765D69F7B2}"/>
-              </a:ext>
-            </a:extLst>
-          </p:cNvPr>
-          <p:cNvPicPr>
-            <a:picLocks noChangeAspect="1"/>
-          </p:cNvPicPr>
-          <p:nvPr/>
-        </p:nvPicPr>
-        <p:blipFill>
-          <a:blip r:embed="rId4">
-            <a:extLst>
-              <a:ext uri="{96DAC541-7B7A-43D3-8B79-37D633B846F1}">
-                <asvg:svgBlip xmlns:asvg="http://schemas.microsoft.com/office/drawing/2016/SVG/main" r:embed="rId5"/>
-              </a:ext>
-            </a:extLst>
-          </a:blip>
-          <a:stretch>
-            <a:fillRect/>
-          </a:stretch>
-        </p:blipFill>
-        <p:spPr>
-          <a:xfrm>
-            <a:off x="6095999" y="3637800"/>
-            <a:ext cx="2692701" cy="2692701"/>
-          </a:xfrm>
-          <a:prstGeom prst="rect">
-            <a:avLst/>
-          </a:prstGeom>
         </p:spPr>
       </p:pic>
       <p:cxnSp>
@@ -3907,14 +3961,14 @@
             </a:extLst>
           </p:cNvPr>
           <p:cNvCxnSpPr>
-            <a:stCxn id="10" idx="0"/>
+            <a:cxnSpLocks/>
           </p:cNvCxnSpPr>
           <p:nvPr/>
         </p:nvCxnSpPr>
         <p:spPr>
-          <a:xfrm flipH="1" flipV="1">
-            <a:off x="7438768" y="2397211"/>
-            <a:ext cx="3582" cy="1240589"/>
+          <a:xfrm>
+            <a:off x="7368210" y="3037233"/>
+            <a:ext cx="0" cy="1168978"/>
           </a:xfrm>
           <a:prstGeom prst="straightConnector1">
             <a:avLst/>
@@ -3952,15 +4006,13 @@
         </p:nvSpPr>
         <p:spPr>
           <a:xfrm>
-            <a:off x="7661189" y="2716542"/>
-            <a:ext cx="1342944" cy="707886"/>
+            <a:off x="7661189" y="3284953"/>
+            <a:ext cx="1539254" cy="707886"/>
           </a:xfrm>
           <a:prstGeom prst="rect">
             <a:avLst/>
           </a:prstGeom>
-          <a:solidFill>
-            <a:schemeClr val="bg1"/>
-          </a:solidFill>
+          <a:noFill/>
         </p:spPr>
         <p:txBody>
           <a:bodyPr wrap="square" rtlCol="0">
@@ -3974,7 +4026,7 @@
                   <a:srgbClr val="3FBAD2"/>
                 </a:solidFill>
               </a:rPr>
-              <a:t>Push</a:t>
+              <a:t>Clone</a:t>
             </a:r>
             <a:endParaRPr kumimoji="1" lang="ko-KR" altLang="en-US" sz="4000" b="1" dirty="0">
               <a:solidFill>
@@ -3984,10 +4036,54 @@
           </a:p>
         </p:txBody>
       </p:sp>
+      <p:sp>
+        <p:nvSpPr>
+          <p:cNvPr id="7" name="TextBox 6">
+            <a:extLst>
+              <a:ext uri="{FF2B5EF4-FFF2-40B4-BE49-F238E27FC236}">
+                <a16:creationId xmlns:a16="http://schemas.microsoft.com/office/drawing/2014/main" id="{4759FCF9-EFF1-9A46-90BD-980CF56EAA15}"/>
+              </a:ext>
+            </a:extLst>
+          </p:cNvPr>
+          <p:cNvSpPr txBox="1"/>
+          <p:nvPr/>
+        </p:nvSpPr>
+        <p:spPr>
+          <a:xfrm>
+            <a:off x="5300342" y="4565823"/>
+            <a:ext cx="4135735" cy="707886"/>
+          </a:xfrm>
+          <a:prstGeom prst="rect">
+            <a:avLst/>
+          </a:prstGeom>
+          <a:noFill/>
+        </p:spPr>
+        <p:txBody>
+          <a:bodyPr wrap="square" rtlCol="0">
+            <a:spAutoFit/>
+          </a:bodyPr>
+          <a:lstStyle/>
+          <a:p>
+            <a:r>
+              <a:rPr kumimoji="1" lang="en-US" altLang="ko-KR" sz="4000" b="1" dirty="0">
+                <a:solidFill>
+                  <a:srgbClr val="3FBAD2"/>
+                </a:solidFill>
+              </a:rPr>
+              <a:t>Empty(None/Null)</a:t>
+            </a:r>
+            <a:endParaRPr kumimoji="1" lang="ko-KR" altLang="en-US" sz="4000" b="1" dirty="0">
+              <a:solidFill>
+                <a:srgbClr val="3FBAD2"/>
+              </a:solidFill>
+            </a:endParaRPr>
+          </a:p>
+        </p:txBody>
+      </p:sp>
     </p:spTree>
     <p:extLst>
       <p:ext uri="{BB962C8B-B14F-4D97-AF65-F5344CB8AC3E}">
-        <p14:creationId xmlns:p14="http://schemas.microsoft.com/office/powerpoint/2010/main" val="3058564077"/>
+        <p14:creationId xmlns:p14="http://schemas.microsoft.com/office/powerpoint/2010/main" val="1278835170"/>
       </p:ext>
     </p:extLst>
   </p:cSld>
@@ -4045,53 +4141,80 @@
             </a:br>
             <a:r>
               <a:rPr kumimoji="1" lang="en-US" altLang="ko-KR" sz="2000" dirty="0"/>
-              <a:t>(Push/Pull: Push)</a:t>
+              <a:t>(History/Commit: What is it?)</a:t>
             </a:r>
             <a:endParaRPr kumimoji="1" lang="ko-KR" altLang="en-US" sz="2000" dirty="0"/>
+          </a:p>
+        </p:txBody>
+      </p:sp>
+      <p:sp>
+        <p:nvSpPr>
+          <p:cNvPr id="14" name="Content Placeholder 9">
+            <a:extLst>
+              <a:ext uri="{FF2B5EF4-FFF2-40B4-BE49-F238E27FC236}">
+                <a16:creationId xmlns:a16="http://schemas.microsoft.com/office/drawing/2014/main" id="{6E7A6D62-2E62-5C4A-93F5-5633B8BA7E71}"/>
+              </a:ext>
+            </a:extLst>
+          </p:cNvPr>
+          <p:cNvSpPr>
+            <a:spLocks noGrp="1"/>
+          </p:cNvSpPr>
+          <p:nvPr>
+            <p:ph idx="1"/>
+          </p:nvPr>
+        </p:nvSpPr>
+        <p:spPr>
+          <a:xfrm>
+            <a:off x="7096259" y="1931510"/>
+            <a:ext cx="4332247" cy="2985836"/>
+          </a:xfrm>
+        </p:spPr>
+        <p:txBody>
+          <a:bodyPr>
+            <a:normAutofit lnSpcReduction="10000"/>
+          </a:bodyPr>
+          <a:lstStyle/>
+          <a:p>
+            <a:pPr>
+              <a:lnSpc>
+                <a:spcPct val="150000"/>
+              </a:lnSpc>
+            </a:pPr>
+            <a:r>
+              <a:rPr lang="en-US" altLang="ko-KR" dirty="0"/>
+              <a:t>1. Get all info, whole data to local device.</a:t>
+            </a:r>
+          </a:p>
+          <a:p>
+            <a:pPr>
+              <a:lnSpc>
+                <a:spcPct val="150000"/>
+              </a:lnSpc>
+            </a:pPr>
+            <a:r>
+              <a:rPr lang="en-US" altLang="ko-KR" dirty="0"/>
+              <a:t>2. So cloning mostly equals to “Download Repository”</a:t>
+            </a:r>
+          </a:p>
+          <a:p>
+            <a:pPr>
+              <a:lnSpc>
+                <a:spcPct val="150000"/>
+              </a:lnSpc>
+            </a:pPr>
+            <a:r>
+              <a:rPr lang="en-US" altLang="ko-KR" dirty="0"/>
+              <a:t>3. Makes a copy of remote repository to local device</a:t>
+            </a:r>
           </a:p>
         </p:txBody>
       </p:sp>
       <p:pic>
         <p:nvPicPr>
-          <p:cNvPr id="8" name="내용 개체 틀 7" descr="흐림">
+          <p:cNvPr id="7" name="내용 개체 틀 7" descr="흐림">
             <a:extLst>
               <a:ext uri="{FF2B5EF4-FFF2-40B4-BE49-F238E27FC236}">
-                <a16:creationId xmlns:a16="http://schemas.microsoft.com/office/drawing/2014/main" id="{CC473D52-D9DF-7245-B95E-2E5B84410631}"/>
-              </a:ext>
-            </a:extLst>
-          </p:cNvPr>
-          <p:cNvPicPr>
-            <a:picLocks noGrp="1" noChangeAspect="1"/>
-          </p:cNvPicPr>
-          <p:nvPr>
-            <p:ph idx="1"/>
-          </p:nvPr>
-        </p:nvPicPr>
-        <p:blipFill>
-          <a:blip r:embed="rId2">
-            <a:extLst>
-              <a:ext uri="{96DAC541-7B7A-43D3-8B79-37D633B846F1}">
-                <asvg:svgBlip xmlns:asvg="http://schemas.microsoft.com/office/drawing/2016/SVG/main" r:embed="rId3"/>
-              </a:ext>
-            </a:extLst>
-          </a:blip>
-          <a:stretch>
-            <a:fillRect/>
-          </a:stretch>
-        </p:blipFill>
-        <p:spPr>
-          <a:xfrm>
-            <a:off x="6096000" y="167889"/>
-            <a:ext cx="2692700" cy="2692700"/>
-          </a:xfrm>
-        </p:spPr>
-      </p:pic>
-      <p:pic>
-        <p:nvPicPr>
-          <p:cNvPr id="10" name="그래픽 9" descr="컴퓨터">
-            <a:extLst>
-              <a:ext uri="{FF2B5EF4-FFF2-40B4-BE49-F238E27FC236}">
-                <a16:creationId xmlns:a16="http://schemas.microsoft.com/office/drawing/2014/main" id="{A39FA564-6661-E044-A2CB-5D765D69F7B2}"/>
+                <a16:creationId xmlns:a16="http://schemas.microsoft.com/office/drawing/2014/main" id="{7D89EB49-F9EE-904A-8513-EAD41C6CCF94}"/>
               </a:ext>
             </a:extLst>
           </p:cNvPr>
@@ -4101,10 +4224,10 @@
           <p:nvPr/>
         </p:nvPicPr>
         <p:blipFill>
-          <a:blip r:embed="rId4">
+          <a:blip r:embed="rId2">
             <a:extLst>
               <a:ext uri="{96DAC541-7B7A-43D3-8B79-37D633B846F1}">
-                <asvg:svgBlip xmlns:asvg="http://schemas.microsoft.com/office/drawing/2016/SVG/main" r:embed="rId5"/>
+                <asvg:svgBlip xmlns:asvg="http://schemas.microsoft.com/office/drawing/2016/SVG/main" r:embed="rId3"/>
               </a:ext>
             </a:extLst>
           </a:blip>
@@ -4114,8 +4237,8 @@
         </p:blipFill>
         <p:spPr>
           <a:xfrm>
-            <a:off x="6095999" y="3637800"/>
-            <a:ext cx="2692701" cy="2692701"/>
+            <a:off x="3880022" y="1406694"/>
+            <a:ext cx="1459230" cy="1459230"/>
           </a:xfrm>
           <a:prstGeom prst="rect">
             <a:avLst/>
@@ -4124,10 +4247,10 @@
       </p:pic>
       <p:cxnSp>
         <p:nvCxnSpPr>
-          <p:cNvPr id="4" name="직선 화살표 연결선 3">
+          <p:cNvPr id="8" name="직선 화살표 연결선 7">
             <a:extLst>
               <a:ext uri="{FF2B5EF4-FFF2-40B4-BE49-F238E27FC236}">
-                <a16:creationId xmlns:a16="http://schemas.microsoft.com/office/drawing/2014/main" id="{B5D155BA-462B-264E-B2D0-6EA0BE8D82ED}"/>
+                <a16:creationId xmlns:a16="http://schemas.microsoft.com/office/drawing/2014/main" id="{AF3ABF5C-1D18-E245-98AA-2DD41D4DF77D}"/>
               </a:ext>
             </a:extLst>
           </p:cNvPr>
@@ -4138,8 +4261,8 @@
         </p:nvCxnSpPr>
         <p:spPr>
           <a:xfrm>
-            <a:off x="7368210" y="2468822"/>
-            <a:ext cx="0" cy="1168978"/>
+            <a:off x="4609637" y="2865924"/>
+            <a:ext cx="0" cy="611678"/>
           </a:xfrm>
           <a:prstGeom prst="straightConnector1">
             <a:avLst/>
@@ -4165,10 +4288,10 @@
       </p:cxnSp>
       <p:sp>
         <p:nvSpPr>
-          <p:cNvPr id="5" name="TextBox 4">
+          <p:cNvPr id="9" name="TextBox 8">
             <a:extLst>
               <a:ext uri="{FF2B5EF4-FFF2-40B4-BE49-F238E27FC236}">
-                <a16:creationId xmlns:a16="http://schemas.microsoft.com/office/drawing/2014/main" id="{88EF81EB-202C-7543-8430-30CD7BEE11CC}"/>
+                <a16:creationId xmlns:a16="http://schemas.microsoft.com/office/drawing/2014/main" id="{58030DF3-0E03-084B-AAEC-1C1719A93ADD}"/>
               </a:ext>
             </a:extLst>
           </p:cNvPr>
@@ -4177,8 +4300,275 @@
         </p:nvSpPr>
         <p:spPr>
           <a:xfrm>
+            <a:off x="4799790" y="2980289"/>
+            <a:ext cx="834154" cy="400110"/>
+          </a:xfrm>
+          <a:prstGeom prst="rect">
+            <a:avLst/>
+          </a:prstGeom>
+          <a:noFill/>
+        </p:spPr>
+        <p:txBody>
+          <a:bodyPr wrap="square" rtlCol="0">
+            <a:spAutoFit/>
+          </a:bodyPr>
+          <a:lstStyle/>
+          <a:p>
+            <a:r>
+              <a:rPr kumimoji="1" lang="en-US" altLang="ko-KR" sz="2000" b="1" dirty="0">
+                <a:solidFill>
+                  <a:srgbClr val="3FBAD2"/>
+                </a:solidFill>
+              </a:rPr>
+              <a:t>Clone</a:t>
+            </a:r>
+            <a:endParaRPr kumimoji="1" lang="ko-KR" altLang="en-US" sz="2000" b="1" dirty="0">
+              <a:solidFill>
+                <a:srgbClr val="3FBAD2"/>
+              </a:solidFill>
+            </a:endParaRPr>
+          </a:p>
+        </p:txBody>
+      </p:sp>
+      <p:sp>
+        <p:nvSpPr>
+          <p:cNvPr id="10" name="TextBox 9">
+            <a:extLst>
+              <a:ext uri="{FF2B5EF4-FFF2-40B4-BE49-F238E27FC236}">
+                <a16:creationId xmlns:a16="http://schemas.microsoft.com/office/drawing/2014/main" id="{56A9BCC8-0ED2-F34D-83FB-93DC8FBA6F3A}"/>
+              </a:ext>
+            </a:extLst>
+          </p:cNvPr>
+          <p:cNvSpPr txBox="1"/>
+          <p:nvPr/>
+        </p:nvSpPr>
+        <p:spPr>
+          <a:xfrm>
+            <a:off x="3600081" y="3792022"/>
+            <a:ext cx="2241241" cy="400110"/>
+          </a:xfrm>
+          <a:prstGeom prst="rect">
+            <a:avLst/>
+          </a:prstGeom>
+          <a:noFill/>
+        </p:spPr>
+        <p:txBody>
+          <a:bodyPr wrap="square" rtlCol="0">
+            <a:spAutoFit/>
+          </a:bodyPr>
+          <a:lstStyle/>
+          <a:p>
+            <a:r>
+              <a:rPr kumimoji="1" lang="en-US" altLang="ko-KR" sz="2000" b="1" dirty="0">
+                <a:solidFill>
+                  <a:srgbClr val="3FBAD2"/>
+                </a:solidFill>
+              </a:rPr>
+              <a:t>Empty(None/Null)</a:t>
+            </a:r>
+            <a:endParaRPr kumimoji="1" lang="ko-KR" altLang="en-US" sz="2000" b="1" dirty="0">
+              <a:solidFill>
+                <a:srgbClr val="3FBAD2"/>
+              </a:solidFill>
+            </a:endParaRPr>
+          </a:p>
+        </p:txBody>
+      </p:sp>
+    </p:spTree>
+    <p:extLst>
+      <p:ext uri="{BB962C8B-B14F-4D97-AF65-F5344CB8AC3E}">
+        <p14:creationId xmlns:p14="http://schemas.microsoft.com/office/powerpoint/2010/main" val="276033070"/>
+      </p:ext>
+    </p:extLst>
+  </p:cSld>
+  <p:clrMapOvr>
+    <a:masterClrMapping/>
+  </p:clrMapOvr>
+</p:sld>
+</file>
+
+<file path=ppt/slides/slide13.xml><?xml version="1.0" encoding="utf-8"?>
+<p:sld xmlns:a="http://schemas.openxmlformats.org/drawingml/2006/main" xmlns:r="http://schemas.openxmlformats.org/officeDocument/2006/relationships" xmlns:p="http://schemas.openxmlformats.org/presentationml/2006/main">
+  <p:cSld>
+    <p:spTree>
+      <p:nvGrpSpPr>
+        <p:cNvPr id="1" name=""/>
+        <p:cNvGrpSpPr/>
+        <p:nvPr/>
+      </p:nvGrpSpPr>
+      <p:grpSpPr>
+        <a:xfrm>
+          <a:off x="0" y="0"/>
+          <a:ext cx="0" cy="0"/>
+          <a:chOff x="0" y="0"/>
+          <a:chExt cx="0" cy="0"/>
+        </a:xfrm>
+      </p:grpSpPr>
+      <p:sp>
+        <p:nvSpPr>
+          <p:cNvPr id="2" name="제목 1">
+            <a:extLst>
+              <a:ext uri="{FF2B5EF4-FFF2-40B4-BE49-F238E27FC236}">
+                <a16:creationId xmlns:a16="http://schemas.microsoft.com/office/drawing/2014/main" id="{A10CF877-DAED-F045-BE49-EFC525016B72}"/>
+              </a:ext>
+            </a:extLst>
+          </p:cNvPr>
+          <p:cNvSpPr>
+            <a:spLocks noGrp="1"/>
+          </p:cNvSpPr>
+          <p:nvPr>
+            <p:ph type="title"/>
+          </p:nvPr>
+        </p:nvSpPr>
+        <p:spPr/>
+        <p:txBody>
+          <a:bodyPr/>
+          <a:lstStyle/>
+          <a:p>
+            <a:pPr algn="ctr"/>
+            <a:r>
+              <a:rPr kumimoji="1" lang="en-US" altLang="ko-KR" dirty="0"/>
+              <a:t>How it works?</a:t>
+            </a:r>
+            <a:br>
+              <a:rPr kumimoji="1" lang="en-US" altLang="ko-KR" dirty="0"/>
+            </a:br>
+            <a:r>
+              <a:rPr kumimoji="1" lang="en-US" altLang="ko-KR" sz="2000" dirty="0"/>
+              <a:t>(Push/Pull: Push)</a:t>
+            </a:r>
+            <a:endParaRPr kumimoji="1" lang="ko-KR" altLang="en-US" sz="2000" dirty="0"/>
+          </a:p>
+        </p:txBody>
+      </p:sp>
+      <p:pic>
+        <p:nvPicPr>
+          <p:cNvPr id="8" name="내용 개체 틀 7" descr="흐림">
+            <a:extLst>
+              <a:ext uri="{FF2B5EF4-FFF2-40B4-BE49-F238E27FC236}">
+                <a16:creationId xmlns:a16="http://schemas.microsoft.com/office/drawing/2014/main" id="{CC473D52-D9DF-7245-B95E-2E5B84410631}"/>
+              </a:ext>
+            </a:extLst>
+          </p:cNvPr>
+          <p:cNvPicPr>
+            <a:picLocks noGrp="1" noChangeAspect="1"/>
+          </p:cNvPicPr>
+          <p:nvPr>
+            <p:ph idx="1"/>
+          </p:nvPr>
+        </p:nvPicPr>
+        <p:blipFill>
+          <a:blip r:embed="rId2">
+            <a:extLst>
+              <a:ext uri="{96DAC541-7B7A-43D3-8B79-37D633B846F1}">
+                <asvg:svgBlip xmlns:asvg="http://schemas.microsoft.com/office/drawing/2016/SVG/main" r:embed="rId3"/>
+              </a:ext>
+            </a:extLst>
+          </a:blip>
+          <a:stretch>
+            <a:fillRect/>
+          </a:stretch>
+        </p:blipFill>
+        <p:spPr>
+          <a:xfrm>
+            <a:off x="6096000" y="167889"/>
+            <a:ext cx="2692700" cy="2692700"/>
+          </a:xfrm>
+        </p:spPr>
+      </p:pic>
+      <p:pic>
+        <p:nvPicPr>
+          <p:cNvPr id="10" name="그래픽 9" descr="컴퓨터">
+            <a:extLst>
+              <a:ext uri="{FF2B5EF4-FFF2-40B4-BE49-F238E27FC236}">
+                <a16:creationId xmlns:a16="http://schemas.microsoft.com/office/drawing/2014/main" id="{A39FA564-6661-E044-A2CB-5D765D69F7B2}"/>
+              </a:ext>
+            </a:extLst>
+          </p:cNvPr>
+          <p:cNvPicPr>
+            <a:picLocks noChangeAspect="1"/>
+          </p:cNvPicPr>
+          <p:nvPr/>
+        </p:nvPicPr>
+        <p:blipFill>
+          <a:blip r:embed="rId4">
+            <a:extLst>
+              <a:ext uri="{96DAC541-7B7A-43D3-8B79-37D633B846F1}">
+                <asvg:svgBlip xmlns:asvg="http://schemas.microsoft.com/office/drawing/2016/SVG/main" r:embed="rId5"/>
+              </a:ext>
+            </a:extLst>
+          </a:blip>
+          <a:stretch>
+            <a:fillRect/>
+          </a:stretch>
+        </p:blipFill>
+        <p:spPr>
+          <a:xfrm>
+            <a:off x="6095999" y="3637800"/>
+            <a:ext cx="2692701" cy="2692701"/>
+          </a:xfrm>
+          <a:prstGeom prst="rect">
+            <a:avLst/>
+          </a:prstGeom>
+        </p:spPr>
+      </p:pic>
+      <p:cxnSp>
+        <p:nvCxnSpPr>
+          <p:cNvPr id="4" name="직선 화살표 연결선 3">
+            <a:extLst>
+              <a:ext uri="{FF2B5EF4-FFF2-40B4-BE49-F238E27FC236}">
+                <a16:creationId xmlns:a16="http://schemas.microsoft.com/office/drawing/2014/main" id="{B5D155BA-462B-264E-B2D0-6EA0BE8D82ED}"/>
+              </a:ext>
+            </a:extLst>
+          </p:cNvPr>
+          <p:cNvCxnSpPr>
+            <a:stCxn id="10" idx="0"/>
+          </p:cNvCxnSpPr>
+          <p:nvPr/>
+        </p:nvCxnSpPr>
+        <p:spPr>
+          <a:xfrm flipH="1" flipV="1">
+            <a:off x="7438768" y="2397211"/>
+            <a:ext cx="3582" cy="1240589"/>
+          </a:xfrm>
+          <a:prstGeom prst="straightConnector1">
+            <a:avLst/>
+          </a:prstGeom>
+          <a:ln w="63500">
+            <a:tailEnd type="triangle"/>
+          </a:ln>
+        </p:spPr>
+        <p:style>
+          <a:lnRef idx="1">
+            <a:schemeClr val="accent1"/>
+          </a:lnRef>
+          <a:fillRef idx="0">
+            <a:schemeClr val="accent1"/>
+          </a:fillRef>
+          <a:effectRef idx="0">
+            <a:schemeClr val="accent1"/>
+          </a:effectRef>
+          <a:fontRef idx="minor">
+            <a:schemeClr val="tx1"/>
+          </a:fontRef>
+        </p:style>
+      </p:cxnSp>
+      <p:sp>
+        <p:nvSpPr>
+          <p:cNvPr id="5" name="TextBox 4">
+            <a:extLst>
+              <a:ext uri="{FF2B5EF4-FFF2-40B4-BE49-F238E27FC236}">
+                <a16:creationId xmlns:a16="http://schemas.microsoft.com/office/drawing/2014/main" id="{88EF81EB-202C-7543-8430-30CD7BEE11CC}"/>
+              </a:ext>
+            </a:extLst>
+          </p:cNvPr>
+          <p:cNvSpPr txBox="1"/>
+          <p:nvPr/>
+        </p:nvSpPr>
+        <p:spPr>
+          <a:xfrm>
             <a:off x="7661189" y="2716542"/>
-            <a:ext cx="1127505" cy="707886"/>
+            <a:ext cx="1342944" cy="707886"/>
           </a:xfrm>
           <a:prstGeom prst="rect">
             <a:avLst/>
@@ -4199,7 +4589,7 @@
                   <a:srgbClr val="3FBAD2"/>
                 </a:solidFill>
               </a:rPr>
-              <a:t>Pull</a:t>
+              <a:t>Push</a:t>
             </a:r>
             <a:endParaRPr kumimoji="1" lang="ko-KR" altLang="en-US" sz="4000" b="1" dirty="0">
               <a:solidFill>
@@ -4212,7 +4602,812 @@
     </p:spTree>
     <p:extLst>
       <p:ext uri="{BB962C8B-B14F-4D97-AF65-F5344CB8AC3E}">
+        <p14:creationId xmlns:p14="http://schemas.microsoft.com/office/powerpoint/2010/main" val="3058564077"/>
+      </p:ext>
+    </p:extLst>
+  </p:cSld>
+  <p:clrMapOvr>
+    <a:masterClrMapping/>
+  </p:clrMapOvr>
+</p:sld>
+</file>
+
+<file path=ppt/slides/slide14.xml><?xml version="1.0" encoding="utf-8"?>
+<p:sld xmlns:a="http://schemas.openxmlformats.org/drawingml/2006/main" xmlns:r="http://schemas.openxmlformats.org/officeDocument/2006/relationships" xmlns:p="http://schemas.openxmlformats.org/presentationml/2006/main">
+  <p:cSld>
+    <p:spTree>
+      <p:nvGrpSpPr>
+        <p:cNvPr id="1" name=""/>
+        <p:cNvGrpSpPr/>
+        <p:nvPr/>
+      </p:nvGrpSpPr>
+      <p:grpSpPr>
+        <a:xfrm>
+          <a:off x="0" y="0"/>
+          <a:ext cx="0" cy="0"/>
+          <a:chOff x="0" y="0"/>
+          <a:chExt cx="0" cy="0"/>
+        </a:xfrm>
+      </p:grpSpPr>
+      <p:sp>
+        <p:nvSpPr>
+          <p:cNvPr id="2" name="제목 1">
+            <a:extLst>
+              <a:ext uri="{FF2B5EF4-FFF2-40B4-BE49-F238E27FC236}">
+                <a16:creationId xmlns:a16="http://schemas.microsoft.com/office/drawing/2014/main" id="{A10CF877-DAED-F045-BE49-EFC525016B72}"/>
+              </a:ext>
+            </a:extLst>
+          </p:cNvPr>
+          <p:cNvSpPr>
+            <a:spLocks noGrp="1"/>
+          </p:cNvSpPr>
+          <p:nvPr>
+            <p:ph type="title"/>
+          </p:nvPr>
+        </p:nvSpPr>
+        <p:spPr/>
+        <p:txBody>
+          <a:bodyPr/>
+          <a:lstStyle/>
+          <a:p>
+            <a:pPr algn="ctr"/>
+            <a:r>
+              <a:rPr kumimoji="1" lang="en-US" altLang="ko-KR" dirty="0"/>
+              <a:t>How it works?</a:t>
+            </a:r>
+            <a:br>
+              <a:rPr kumimoji="1" lang="en-US" altLang="ko-KR" dirty="0"/>
+            </a:br>
+            <a:r>
+              <a:rPr kumimoji="1" lang="en-US" altLang="ko-KR" sz="2000" dirty="0"/>
+              <a:t>(History/Commit: What is it?)</a:t>
+            </a:r>
+            <a:endParaRPr kumimoji="1" lang="ko-KR" altLang="en-US" sz="2000" dirty="0"/>
+          </a:p>
+        </p:txBody>
+      </p:sp>
+      <p:sp>
+        <p:nvSpPr>
+          <p:cNvPr id="14" name="Content Placeholder 9">
+            <a:extLst>
+              <a:ext uri="{FF2B5EF4-FFF2-40B4-BE49-F238E27FC236}">
+                <a16:creationId xmlns:a16="http://schemas.microsoft.com/office/drawing/2014/main" id="{6E7A6D62-2E62-5C4A-93F5-5633B8BA7E71}"/>
+              </a:ext>
+            </a:extLst>
+          </p:cNvPr>
+          <p:cNvSpPr>
+            <a:spLocks noGrp="1"/>
+          </p:cNvSpPr>
+          <p:nvPr>
+            <p:ph idx="1"/>
+          </p:nvPr>
+        </p:nvSpPr>
+        <p:spPr>
+          <a:xfrm>
+            <a:off x="7096259" y="1931510"/>
+            <a:ext cx="4332247" cy="2985836"/>
+          </a:xfrm>
+        </p:spPr>
+        <p:txBody>
+          <a:bodyPr>
+            <a:normAutofit/>
+          </a:bodyPr>
+          <a:lstStyle/>
+          <a:p>
+            <a:pPr>
+              <a:lnSpc>
+                <a:spcPct val="150000"/>
+              </a:lnSpc>
+            </a:pPr>
+            <a:r>
+              <a:rPr lang="en-US" altLang="ko-KR" dirty="0"/>
+              <a:t>1. Upload changed git data</a:t>
+            </a:r>
+          </a:p>
+          <a:p>
+            <a:pPr>
+              <a:lnSpc>
+                <a:spcPct val="150000"/>
+              </a:lnSpc>
+            </a:pPr>
+            <a:r>
+              <a:rPr lang="en-US" altLang="ko-KR" dirty="0"/>
+              <a:t>2. Includes file changes</a:t>
+            </a:r>
+          </a:p>
+          <a:p>
+            <a:pPr>
+              <a:lnSpc>
+                <a:spcPct val="150000"/>
+              </a:lnSpc>
+            </a:pPr>
+            <a:r>
+              <a:rPr lang="en-US" altLang="ko-KR" dirty="0"/>
+              <a:t>3. Applying update to remote repository(from local repository)</a:t>
+            </a:r>
+          </a:p>
+        </p:txBody>
+      </p:sp>
+      <p:pic>
+        <p:nvPicPr>
+          <p:cNvPr id="11" name="내용 개체 틀 7" descr="흐림">
+            <a:extLst>
+              <a:ext uri="{FF2B5EF4-FFF2-40B4-BE49-F238E27FC236}">
+                <a16:creationId xmlns:a16="http://schemas.microsoft.com/office/drawing/2014/main" id="{8F2377AD-E513-0D48-A91E-774BFA6A6323}"/>
+              </a:ext>
+            </a:extLst>
+          </p:cNvPr>
+          <p:cNvPicPr>
+            <a:picLocks noChangeAspect="1"/>
+          </p:cNvPicPr>
+          <p:nvPr/>
+        </p:nvPicPr>
+        <p:blipFill>
+          <a:blip r:embed="rId2">
+            <a:extLst>
+              <a:ext uri="{96DAC541-7B7A-43D3-8B79-37D633B846F1}">
+                <asvg:svgBlip xmlns:asvg="http://schemas.microsoft.com/office/drawing/2016/SVG/main" r:embed="rId3"/>
+              </a:ext>
+            </a:extLst>
+          </a:blip>
+          <a:stretch>
+            <a:fillRect/>
+          </a:stretch>
+        </p:blipFill>
+        <p:spPr>
+          <a:xfrm>
+            <a:off x="4376382" y="1632785"/>
+            <a:ext cx="1397549" cy="1397549"/>
+          </a:xfrm>
+          <a:prstGeom prst="rect">
+            <a:avLst/>
+          </a:prstGeom>
+        </p:spPr>
+      </p:pic>
+      <p:pic>
+        <p:nvPicPr>
+          <p:cNvPr id="12" name="그래픽 11" descr="컴퓨터">
+            <a:extLst>
+              <a:ext uri="{FF2B5EF4-FFF2-40B4-BE49-F238E27FC236}">
+                <a16:creationId xmlns:a16="http://schemas.microsoft.com/office/drawing/2014/main" id="{3310190C-5776-CA48-B17B-425B589C04D7}"/>
+              </a:ext>
+            </a:extLst>
+          </p:cNvPr>
+          <p:cNvPicPr>
+            <a:picLocks noChangeAspect="1"/>
+          </p:cNvPicPr>
+          <p:nvPr/>
+        </p:nvPicPr>
+        <p:blipFill>
+          <a:blip r:embed="rId4">
+            <a:extLst>
+              <a:ext uri="{96DAC541-7B7A-43D3-8B79-37D633B846F1}">
+                <asvg:svgBlip xmlns:asvg="http://schemas.microsoft.com/office/drawing/2016/SVG/main" r:embed="rId5"/>
+              </a:ext>
+            </a:extLst>
+          </a:blip>
+          <a:stretch>
+            <a:fillRect/>
+          </a:stretch>
+        </p:blipFill>
+        <p:spPr>
+          <a:xfrm>
+            <a:off x="4376381" y="3731097"/>
+            <a:ext cx="1397550" cy="1397550"/>
+          </a:xfrm>
+          <a:prstGeom prst="rect">
+            <a:avLst/>
+          </a:prstGeom>
+        </p:spPr>
+      </p:pic>
+      <p:cxnSp>
+        <p:nvCxnSpPr>
+          <p:cNvPr id="13" name="직선 화살표 연결선 12">
+            <a:extLst>
+              <a:ext uri="{FF2B5EF4-FFF2-40B4-BE49-F238E27FC236}">
+                <a16:creationId xmlns:a16="http://schemas.microsoft.com/office/drawing/2014/main" id="{900DDD72-1470-044C-9233-67DE76F45168}"/>
+              </a:ext>
+            </a:extLst>
+          </p:cNvPr>
+          <p:cNvCxnSpPr>
+            <a:cxnSpLocks/>
+            <a:stCxn id="12" idx="0"/>
+            <a:endCxn id="11" idx="2"/>
+          </p:cNvCxnSpPr>
+          <p:nvPr/>
+        </p:nvCxnSpPr>
+        <p:spPr>
+          <a:xfrm flipV="1">
+            <a:off x="5075156" y="3030334"/>
+            <a:ext cx="1" cy="700763"/>
+          </a:xfrm>
+          <a:prstGeom prst="straightConnector1">
+            <a:avLst/>
+          </a:prstGeom>
+          <a:ln w="63500">
+            <a:tailEnd type="triangle"/>
+          </a:ln>
+        </p:spPr>
+        <p:style>
+          <a:lnRef idx="1">
+            <a:schemeClr val="accent1"/>
+          </a:lnRef>
+          <a:fillRef idx="0">
+            <a:schemeClr val="accent1"/>
+          </a:fillRef>
+          <a:effectRef idx="0">
+            <a:schemeClr val="accent1"/>
+          </a:effectRef>
+          <a:fontRef idx="minor">
+            <a:schemeClr val="tx1"/>
+          </a:fontRef>
+        </p:style>
+      </p:cxnSp>
+      <p:sp>
+        <p:nvSpPr>
+          <p:cNvPr id="15" name="TextBox 14">
+            <a:extLst>
+              <a:ext uri="{FF2B5EF4-FFF2-40B4-BE49-F238E27FC236}">
+                <a16:creationId xmlns:a16="http://schemas.microsoft.com/office/drawing/2014/main" id="{8D5A2E72-CEFF-A246-8F2A-ABCA8284EF7F}"/>
+              </a:ext>
+            </a:extLst>
+          </p:cNvPr>
+          <p:cNvSpPr txBox="1"/>
+          <p:nvPr/>
+        </p:nvSpPr>
+        <p:spPr>
+          <a:xfrm>
+            <a:off x="5193494" y="3180660"/>
+            <a:ext cx="726785" cy="400110"/>
+          </a:xfrm>
+          <a:prstGeom prst="rect">
+            <a:avLst/>
+          </a:prstGeom>
+          <a:solidFill>
+            <a:schemeClr val="bg1"/>
+          </a:solidFill>
+        </p:spPr>
+        <p:txBody>
+          <a:bodyPr wrap="square" rtlCol="0">
+            <a:spAutoFit/>
+          </a:bodyPr>
+          <a:lstStyle/>
+          <a:p>
+            <a:r>
+              <a:rPr kumimoji="1" lang="en-US" altLang="ko-KR" sz="2000" b="1" dirty="0">
+                <a:solidFill>
+                  <a:srgbClr val="3FBAD2"/>
+                </a:solidFill>
+              </a:rPr>
+              <a:t>Push</a:t>
+            </a:r>
+            <a:endParaRPr kumimoji="1" lang="ko-KR" altLang="en-US" sz="2000" b="1" dirty="0">
+              <a:solidFill>
+                <a:srgbClr val="3FBAD2"/>
+              </a:solidFill>
+            </a:endParaRPr>
+          </a:p>
+        </p:txBody>
+      </p:sp>
+    </p:spTree>
+    <p:extLst>
+      <p:ext uri="{BB962C8B-B14F-4D97-AF65-F5344CB8AC3E}">
+        <p14:creationId xmlns:p14="http://schemas.microsoft.com/office/powerpoint/2010/main" val="2035793867"/>
+      </p:ext>
+    </p:extLst>
+  </p:cSld>
+  <p:clrMapOvr>
+    <a:masterClrMapping/>
+  </p:clrMapOvr>
+</p:sld>
+</file>
+
+<file path=ppt/slides/slide15.xml><?xml version="1.0" encoding="utf-8"?>
+<p:sld xmlns:a="http://schemas.openxmlformats.org/drawingml/2006/main" xmlns:r="http://schemas.openxmlformats.org/officeDocument/2006/relationships" xmlns:p="http://schemas.openxmlformats.org/presentationml/2006/main">
+  <p:cSld>
+    <p:spTree>
+      <p:nvGrpSpPr>
+        <p:cNvPr id="1" name=""/>
+        <p:cNvGrpSpPr/>
+        <p:nvPr/>
+      </p:nvGrpSpPr>
+      <p:grpSpPr>
+        <a:xfrm>
+          <a:off x="0" y="0"/>
+          <a:ext cx="0" cy="0"/>
+          <a:chOff x="0" y="0"/>
+          <a:chExt cx="0" cy="0"/>
+        </a:xfrm>
+      </p:grpSpPr>
+      <p:sp>
+        <p:nvSpPr>
+          <p:cNvPr id="2" name="제목 1">
+            <a:extLst>
+              <a:ext uri="{FF2B5EF4-FFF2-40B4-BE49-F238E27FC236}">
+                <a16:creationId xmlns:a16="http://schemas.microsoft.com/office/drawing/2014/main" id="{A10CF877-DAED-F045-BE49-EFC525016B72}"/>
+              </a:ext>
+            </a:extLst>
+          </p:cNvPr>
+          <p:cNvSpPr>
+            <a:spLocks noGrp="1"/>
+          </p:cNvSpPr>
+          <p:nvPr>
+            <p:ph type="title"/>
+          </p:nvPr>
+        </p:nvSpPr>
+        <p:spPr/>
+        <p:txBody>
+          <a:bodyPr/>
+          <a:lstStyle/>
+          <a:p>
+            <a:pPr algn="ctr"/>
+            <a:r>
+              <a:rPr kumimoji="1" lang="en-US" altLang="ko-KR" dirty="0"/>
+              <a:t>How it works?</a:t>
+            </a:r>
+            <a:br>
+              <a:rPr kumimoji="1" lang="en-US" altLang="ko-KR" dirty="0"/>
+            </a:br>
+            <a:r>
+              <a:rPr kumimoji="1" lang="en-US" altLang="ko-KR" sz="2000" dirty="0"/>
+              <a:t>(Push/Pull: Push)</a:t>
+            </a:r>
+            <a:endParaRPr kumimoji="1" lang="ko-KR" altLang="en-US" sz="2000" dirty="0"/>
+          </a:p>
+        </p:txBody>
+      </p:sp>
+      <p:pic>
+        <p:nvPicPr>
+          <p:cNvPr id="8" name="내용 개체 틀 7" descr="흐림">
+            <a:extLst>
+              <a:ext uri="{FF2B5EF4-FFF2-40B4-BE49-F238E27FC236}">
+                <a16:creationId xmlns:a16="http://schemas.microsoft.com/office/drawing/2014/main" id="{CC473D52-D9DF-7245-B95E-2E5B84410631}"/>
+              </a:ext>
+            </a:extLst>
+          </p:cNvPr>
+          <p:cNvPicPr>
+            <a:picLocks noGrp="1" noChangeAspect="1"/>
+          </p:cNvPicPr>
+          <p:nvPr>
+            <p:ph idx="1"/>
+          </p:nvPr>
+        </p:nvPicPr>
+        <p:blipFill>
+          <a:blip r:embed="rId2">
+            <a:extLst>
+              <a:ext uri="{96DAC541-7B7A-43D3-8B79-37D633B846F1}">
+                <asvg:svgBlip xmlns:asvg="http://schemas.microsoft.com/office/drawing/2016/SVG/main" r:embed="rId3"/>
+              </a:ext>
+            </a:extLst>
+          </a:blip>
+          <a:stretch>
+            <a:fillRect/>
+          </a:stretch>
+        </p:blipFill>
+        <p:spPr>
+          <a:xfrm>
+            <a:off x="6096000" y="167889"/>
+            <a:ext cx="2692700" cy="2692700"/>
+          </a:xfrm>
+        </p:spPr>
+      </p:pic>
+      <p:pic>
+        <p:nvPicPr>
+          <p:cNvPr id="10" name="그래픽 9" descr="컴퓨터">
+            <a:extLst>
+              <a:ext uri="{FF2B5EF4-FFF2-40B4-BE49-F238E27FC236}">
+                <a16:creationId xmlns:a16="http://schemas.microsoft.com/office/drawing/2014/main" id="{A39FA564-6661-E044-A2CB-5D765D69F7B2}"/>
+              </a:ext>
+            </a:extLst>
+          </p:cNvPr>
+          <p:cNvPicPr>
+            <a:picLocks noChangeAspect="1"/>
+          </p:cNvPicPr>
+          <p:nvPr/>
+        </p:nvPicPr>
+        <p:blipFill>
+          <a:blip r:embed="rId4">
+            <a:extLst>
+              <a:ext uri="{96DAC541-7B7A-43D3-8B79-37D633B846F1}">
+                <asvg:svgBlip xmlns:asvg="http://schemas.microsoft.com/office/drawing/2016/SVG/main" r:embed="rId5"/>
+              </a:ext>
+            </a:extLst>
+          </a:blip>
+          <a:stretch>
+            <a:fillRect/>
+          </a:stretch>
+        </p:blipFill>
+        <p:spPr>
+          <a:xfrm>
+            <a:off x="6095999" y="3637800"/>
+            <a:ext cx="2692701" cy="2692701"/>
+          </a:xfrm>
+          <a:prstGeom prst="rect">
+            <a:avLst/>
+          </a:prstGeom>
+        </p:spPr>
+      </p:pic>
+      <p:cxnSp>
+        <p:nvCxnSpPr>
+          <p:cNvPr id="4" name="직선 화살표 연결선 3">
+            <a:extLst>
+              <a:ext uri="{FF2B5EF4-FFF2-40B4-BE49-F238E27FC236}">
+                <a16:creationId xmlns:a16="http://schemas.microsoft.com/office/drawing/2014/main" id="{B5D155BA-462B-264E-B2D0-6EA0BE8D82ED}"/>
+              </a:ext>
+            </a:extLst>
+          </p:cNvPr>
+          <p:cNvCxnSpPr>
+            <a:cxnSpLocks/>
+          </p:cNvCxnSpPr>
+          <p:nvPr/>
+        </p:nvCxnSpPr>
+        <p:spPr>
+          <a:xfrm>
+            <a:off x="7368210" y="2468822"/>
+            <a:ext cx="0" cy="1168978"/>
+          </a:xfrm>
+          <a:prstGeom prst="straightConnector1">
+            <a:avLst/>
+          </a:prstGeom>
+          <a:ln w="63500">
+            <a:tailEnd type="triangle"/>
+          </a:ln>
+        </p:spPr>
+        <p:style>
+          <a:lnRef idx="1">
+            <a:schemeClr val="accent1"/>
+          </a:lnRef>
+          <a:fillRef idx="0">
+            <a:schemeClr val="accent1"/>
+          </a:fillRef>
+          <a:effectRef idx="0">
+            <a:schemeClr val="accent1"/>
+          </a:effectRef>
+          <a:fontRef idx="minor">
+            <a:schemeClr val="tx1"/>
+          </a:fontRef>
+        </p:style>
+      </p:cxnSp>
+      <p:sp>
+        <p:nvSpPr>
+          <p:cNvPr id="5" name="TextBox 4">
+            <a:extLst>
+              <a:ext uri="{FF2B5EF4-FFF2-40B4-BE49-F238E27FC236}">
+                <a16:creationId xmlns:a16="http://schemas.microsoft.com/office/drawing/2014/main" id="{88EF81EB-202C-7543-8430-30CD7BEE11CC}"/>
+              </a:ext>
+            </a:extLst>
+          </p:cNvPr>
+          <p:cNvSpPr txBox="1"/>
+          <p:nvPr/>
+        </p:nvSpPr>
+        <p:spPr>
+          <a:xfrm>
+            <a:off x="7661189" y="2716542"/>
+            <a:ext cx="1127505" cy="707886"/>
+          </a:xfrm>
+          <a:prstGeom prst="rect">
+            <a:avLst/>
+          </a:prstGeom>
+          <a:solidFill>
+            <a:schemeClr val="bg1"/>
+          </a:solidFill>
+        </p:spPr>
+        <p:txBody>
+          <a:bodyPr wrap="square" rtlCol="0">
+            <a:spAutoFit/>
+          </a:bodyPr>
+          <a:lstStyle/>
+          <a:p>
+            <a:r>
+              <a:rPr kumimoji="1" lang="en-US" altLang="ko-KR" sz="4000" b="1" dirty="0">
+                <a:solidFill>
+                  <a:srgbClr val="3FBAD2"/>
+                </a:solidFill>
+              </a:rPr>
+              <a:t>Pull</a:t>
+            </a:r>
+            <a:endParaRPr kumimoji="1" lang="ko-KR" altLang="en-US" sz="4000" b="1" dirty="0">
+              <a:solidFill>
+                <a:srgbClr val="3FBAD2"/>
+              </a:solidFill>
+            </a:endParaRPr>
+          </a:p>
+        </p:txBody>
+      </p:sp>
+    </p:spTree>
+    <p:extLst>
+      <p:ext uri="{BB962C8B-B14F-4D97-AF65-F5344CB8AC3E}">
         <p14:creationId xmlns:p14="http://schemas.microsoft.com/office/powerpoint/2010/main" val="3881036770"/>
+      </p:ext>
+    </p:extLst>
+  </p:cSld>
+  <p:clrMapOvr>
+    <a:masterClrMapping/>
+  </p:clrMapOvr>
+</p:sld>
+</file>
+
+<file path=ppt/slides/slide16.xml><?xml version="1.0" encoding="utf-8"?>
+<p:sld xmlns:a="http://schemas.openxmlformats.org/drawingml/2006/main" xmlns:r="http://schemas.openxmlformats.org/officeDocument/2006/relationships" xmlns:p="http://schemas.openxmlformats.org/presentationml/2006/main">
+  <p:cSld>
+    <p:spTree>
+      <p:nvGrpSpPr>
+        <p:cNvPr id="1" name=""/>
+        <p:cNvGrpSpPr/>
+        <p:nvPr/>
+      </p:nvGrpSpPr>
+      <p:grpSpPr>
+        <a:xfrm>
+          <a:off x="0" y="0"/>
+          <a:ext cx="0" cy="0"/>
+          <a:chOff x="0" y="0"/>
+          <a:chExt cx="0" cy="0"/>
+        </a:xfrm>
+      </p:grpSpPr>
+      <p:sp>
+        <p:nvSpPr>
+          <p:cNvPr id="2" name="제목 1">
+            <a:extLst>
+              <a:ext uri="{FF2B5EF4-FFF2-40B4-BE49-F238E27FC236}">
+                <a16:creationId xmlns:a16="http://schemas.microsoft.com/office/drawing/2014/main" id="{A10CF877-DAED-F045-BE49-EFC525016B72}"/>
+              </a:ext>
+            </a:extLst>
+          </p:cNvPr>
+          <p:cNvSpPr>
+            <a:spLocks noGrp="1"/>
+          </p:cNvSpPr>
+          <p:nvPr>
+            <p:ph type="title"/>
+          </p:nvPr>
+        </p:nvSpPr>
+        <p:spPr/>
+        <p:txBody>
+          <a:bodyPr/>
+          <a:lstStyle/>
+          <a:p>
+            <a:pPr algn="ctr"/>
+            <a:r>
+              <a:rPr kumimoji="1" lang="en-US" altLang="ko-KR" dirty="0"/>
+              <a:t>How it works?</a:t>
+            </a:r>
+            <a:br>
+              <a:rPr kumimoji="1" lang="en-US" altLang="ko-KR" dirty="0"/>
+            </a:br>
+            <a:r>
+              <a:rPr kumimoji="1" lang="en-US" altLang="ko-KR" sz="2000" dirty="0"/>
+              <a:t>(History/Commit: What is it?)</a:t>
+            </a:r>
+            <a:endParaRPr kumimoji="1" lang="ko-KR" altLang="en-US" sz="2000" dirty="0"/>
+          </a:p>
+        </p:txBody>
+      </p:sp>
+      <p:sp>
+        <p:nvSpPr>
+          <p:cNvPr id="14" name="Content Placeholder 9">
+            <a:extLst>
+              <a:ext uri="{FF2B5EF4-FFF2-40B4-BE49-F238E27FC236}">
+                <a16:creationId xmlns:a16="http://schemas.microsoft.com/office/drawing/2014/main" id="{6E7A6D62-2E62-5C4A-93F5-5633B8BA7E71}"/>
+              </a:ext>
+            </a:extLst>
+          </p:cNvPr>
+          <p:cNvSpPr>
+            <a:spLocks noGrp="1"/>
+          </p:cNvSpPr>
+          <p:nvPr>
+            <p:ph idx="1"/>
+          </p:nvPr>
+        </p:nvSpPr>
+        <p:spPr>
+          <a:xfrm>
+            <a:off x="7096259" y="1931510"/>
+            <a:ext cx="4332247" cy="2985836"/>
+          </a:xfrm>
+        </p:spPr>
+        <p:txBody>
+          <a:bodyPr>
+            <a:normAutofit/>
+          </a:bodyPr>
+          <a:lstStyle/>
+          <a:p>
+            <a:pPr>
+              <a:lnSpc>
+                <a:spcPct val="150000"/>
+              </a:lnSpc>
+            </a:pPr>
+            <a:r>
+              <a:rPr lang="en-US" altLang="ko-KR" dirty="0"/>
+              <a:t>1. Fetch remote repository</a:t>
+            </a:r>
+          </a:p>
+          <a:p>
+            <a:pPr>
+              <a:lnSpc>
+                <a:spcPct val="150000"/>
+              </a:lnSpc>
+            </a:pPr>
+            <a:r>
+              <a:rPr lang="en-US" altLang="ko-KR" dirty="0"/>
+              <a:t>2. Update Local repository(from Remote repository)</a:t>
+            </a:r>
+          </a:p>
+          <a:p>
+            <a:pPr>
+              <a:lnSpc>
+                <a:spcPct val="150000"/>
+              </a:lnSpc>
+            </a:pPr>
+            <a:r>
+              <a:rPr lang="en-US" altLang="ko-KR" dirty="0"/>
+              <a:t>3. It is completely differ from Cloning</a:t>
+            </a:r>
+          </a:p>
+        </p:txBody>
+      </p:sp>
+      <p:pic>
+        <p:nvPicPr>
+          <p:cNvPr id="8" name="내용 개체 틀 7" descr="흐림">
+            <a:extLst>
+              <a:ext uri="{FF2B5EF4-FFF2-40B4-BE49-F238E27FC236}">
+                <a16:creationId xmlns:a16="http://schemas.microsoft.com/office/drawing/2014/main" id="{DD3D6C34-AE4C-D442-B9E8-BC0BCE1B3204}"/>
+              </a:ext>
+            </a:extLst>
+          </p:cNvPr>
+          <p:cNvPicPr>
+            <a:picLocks noChangeAspect="1"/>
+          </p:cNvPicPr>
+          <p:nvPr/>
+        </p:nvPicPr>
+        <p:blipFill>
+          <a:blip r:embed="rId2">
+            <a:extLst>
+              <a:ext uri="{96DAC541-7B7A-43D3-8B79-37D633B846F1}">
+                <asvg:svgBlip xmlns:asvg="http://schemas.microsoft.com/office/drawing/2016/SVG/main" r:embed="rId3"/>
+              </a:ext>
+            </a:extLst>
+          </a:blip>
+          <a:stretch>
+            <a:fillRect/>
+          </a:stretch>
+        </p:blipFill>
+        <p:spPr>
+          <a:xfrm>
+            <a:off x="4419827" y="1735655"/>
+            <a:ext cx="1351829" cy="1351829"/>
+          </a:xfrm>
+          <a:prstGeom prst="rect">
+            <a:avLst/>
+          </a:prstGeom>
+        </p:spPr>
+      </p:pic>
+      <p:pic>
+        <p:nvPicPr>
+          <p:cNvPr id="9" name="그래픽 8" descr="컴퓨터">
+            <a:extLst>
+              <a:ext uri="{FF2B5EF4-FFF2-40B4-BE49-F238E27FC236}">
+                <a16:creationId xmlns:a16="http://schemas.microsoft.com/office/drawing/2014/main" id="{B8221076-9401-6F42-9A32-B94EBCE62854}"/>
+              </a:ext>
+            </a:extLst>
+          </p:cNvPr>
+          <p:cNvPicPr>
+            <a:picLocks noChangeAspect="1"/>
+          </p:cNvPicPr>
+          <p:nvPr/>
+        </p:nvPicPr>
+        <p:blipFill>
+          <a:blip r:embed="rId4">
+            <a:extLst>
+              <a:ext uri="{96DAC541-7B7A-43D3-8B79-37D633B846F1}">
+                <asvg:svgBlip xmlns:asvg="http://schemas.microsoft.com/office/drawing/2016/SVG/main" r:embed="rId5"/>
+              </a:ext>
+            </a:extLst>
+          </a:blip>
+          <a:stretch>
+            <a:fillRect/>
+          </a:stretch>
+        </p:blipFill>
+        <p:spPr>
+          <a:xfrm>
+            <a:off x="4419827" y="3741630"/>
+            <a:ext cx="1351830" cy="1351830"/>
+          </a:xfrm>
+          <a:prstGeom prst="rect">
+            <a:avLst/>
+          </a:prstGeom>
+        </p:spPr>
+      </p:pic>
+      <p:cxnSp>
+        <p:nvCxnSpPr>
+          <p:cNvPr id="10" name="직선 화살표 연결선 9">
+            <a:extLst>
+              <a:ext uri="{FF2B5EF4-FFF2-40B4-BE49-F238E27FC236}">
+                <a16:creationId xmlns:a16="http://schemas.microsoft.com/office/drawing/2014/main" id="{24357F70-2AA8-074C-81BE-28D99C08292E}"/>
+              </a:ext>
+            </a:extLst>
+          </p:cNvPr>
+          <p:cNvCxnSpPr>
+            <a:cxnSpLocks/>
+            <a:stCxn id="8" idx="2"/>
+            <a:endCxn id="9" idx="0"/>
+          </p:cNvCxnSpPr>
+          <p:nvPr/>
+        </p:nvCxnSpPr>
+        <p:spPr>
+          <a:xfrm>
+            <a:off x="5095742" y="3087484"/>
+            <a:ext cx="0" cy="654146"/>
+          </a:xfrm>
+          <a:prstGeom prst="straightConnector1">
+            <a:avLst/>
+          </a:prstGeom>
+          <a:ln w="63500">
+            <a:tailEnd type="triangle"/>
+          </a:ln>
+        </p:spPr>
+        <p:style>
+          <a:lnRef idx="1">
+            <a:schemeClr val="accent1"/>
+          </a:lnRef>
+          <a:fillRef idx="0">
+            <a:schemeClr val="accent1"/>
+          </a:fillRef>
+          <a:effectRef idx="0">
+            <a:schemeClr val="accent1"/>
+          </a:effectRef>
+          <a:fontRef idx="minor">
+            <a:schemeClr val="tx1"/>
+          </a:fontRef>
+        </p:style>
+      </p:cxnSp>
+      <p:sp>
+        <p:nvSpPr>
+          <p:cNvPr id="16" name="TextBox 15">
+            <a:extLst>
+              <a:ext uri="{FF2B5EF4-FFF2-40B4-BE49-F238E27FC236}">
+                <a16:creationId xmlns:a16="http://schemas.microsoft.com/office/drawing/2014/main" id="{43B2FA30-5D8C-314D-A47A-F646F8360AAD}"/>
+              </a:ext>
+            </a:extLst>
+          </p:cNvPr>
+          <p:cNvSpPr txBox="1"/>
+          <p:nvPr/>
+        </p:nvSpPr>
+        <p:spPr>
+          <a:xfrm>
+            <a:off x="5194714" y="3264242"/>
+            <a:ext cx="724385" cy="400110"/>
+          </a:xfrm>
+          <a:prstGeom prst="rect">
+            <a:avLst/>
+          </a:prstGeom>
+          <a:solidFill>
+            <a:schemeClr val="bg1"/>
+          </a:solidFill>
+        </p:spPr>
+        <p:txBody>
+          <a:bodyPr wrap="square" rtlCol="0">
+            <a:spAutoFit/>
+          </a:bodyPr>
+          <a:lstStyle/>
+          <a:p>
+            <a:r>
+              <a:rPr kumimoji="1" lang="en-US" altLang="ko-KR" sz="2000" b="1" dirty="0">
+                <a:solidFill>
+                  <a:srgbClr val="3FBAD2"/>
+                </a:solidFill>
+              </a:rPr>
+              <a:t>Pull</a:t>
+            </a:r>
+            <a:endParaRPr kumimoji="1" lang="ko-KR" altLang="en-US" sz="2000" b="1" dirty="0">
+              <a:solidFill>
+                <a:srgbClr val="3FBAD2"/>
+              </a:solidFill>
+            </a:endParaRPr>
+          </a:p>
+        </p:txBody>
+      </p:sp>
+    </p:spTree>
+    <p:extLst>
+      <p:ext uri="{BB962C8B-B14F-4D97-AF65-F5344CB8AC3E}">
+        <p14:creationId xmlns:p14="http://schemas.microsoft.com/office/powerpoint/2010/main" val="135175701"/>
       </p:ext>
     </p:extLst>
   </p:cSld>
@@ -4290,30 +5485,55 @@
           <a:bodyPr/>
           <a:lstStyle/>
           <a:p>
+            <a:pPr>
+              <a:lnSpc>
+                <a:spcPct val="150000"/>
+              </a:lnSpc>
+            </a:pPr>
             <a:r>
               <a:rPr kumimoji="1" lang="en-US" altLang="ko-KR" dirty="0"/>
               <a:t>1. What is git?</a:t>
             </a:r>
           </a:p>
           <a:p>
+            <a:pPr>
+              <a:lnSpc>
+                <a:spcPct val="150000"/>
+              </a:lnSpc>
+            </a:pPr>
             <a:r>
               <a:rPr kumimoji="1" lang="en-US" altLang="ko-KR" dirty="0"/>
               <a:t>2. How it works?</a:t>
             </a:r>
           </a:p>
           <a:p>
+            <a:pPr>
+              <a:lnSpc>
+                <a:spcPct val="150000"/>
+              </a:lnSpc>
+            </a:pPr>
             <a:r>
               <a:rPr kumimoji="1" lang="en-US" altLang="ko-KR" dirty="0"/>
               <a:t>3. Installing git on Windows</a:t>
             </a:r>
           </a:p>
           <a:p>
+            <a:pPr>
+              <a:lnSpc>
+                <a:spcPct val="150000"/>
+              </a:lnSpc>
+            </a:pPr>
             <a:r>
               <a:rPr kumimoji="1" lang="en-US" altLang="ko-KR" dirty="0"/>
               <a:t>4. Installing git on macOS</a:t>
             </a:r>
           </a:p>
           <a:p>
+            <a:pPr>
+              <a:lnSpc>
+                <a:spcPct val="150000"/>
+              </a:lnSpc>
+            </a:pPr>
             <a:r>
               <a:rPr kumimoji="1" lang="en-US" altLang="ko-KR" dirty="0"/>
               <a:t>5. Installing git on Ubuntu/Linux</a:t>
@@ -4923,12 +6143,22 @@
           </a:bodyPr>
           <a:lstStyle/>
           <a:p>
+            <a:pPr>
+              <a:lnSpc>
+                <a:spcPct val="150000"/>
+              </a:lnSpc>
+            </a:pPr>
             <a:r>
               <a:rPr lang="en-US" altLang="ko-KR" dirty="0"/>
               <a:t>”Distributed” Shape</a:t>
             </a:r>
           </a:p>
           <a:p>
+            <a:pPr>
+              <a:lnSpc>
+                <a:spcPct val="150000"/>
+              </a:lnSpc>
+            </a:pPr>
             <a:r>
               <a:rPr lang="en-US" dirty="0"/>
               <a:t>Top(commit/push)-</a:t>
@@ -4949,6 +6179,11 @@
             </a:r>
           </a:p>
           <a:p>
+            <a:pPr>
+              <a:lnSpc>
+                <a:spcPct val="150000"/>
+              </a:lnSpc>
+            </a:pPr>
             <a:r>
               <a:rPr lang="en-US" dirty="0"/>
               <a:t>Interactive/communicative</a:t>
@@ -5648,6 +6883,11 @@
           </a:bodyPr>
           <a:lstStyle/>
           <a:p>
+            <a:pPr>
+              <a:lnSpc>
+                <a:spcPct val="150000"/>
+              </a:lnSpc>
+            </a:pPr>
             <a:r>
               <a:rPr lang="en-US" altLang="ko-KR" dirty="0"/>
               <a:t>1.</a:t>
@@ -5662,12 +6902,22 @@
             </a:r>
           </a:p>
           <a:p>
+            <a:pPr>
+              <a:lnSpc>
+                <a:spcPct val="150000"/>
+              </a:lnSpc>
+            </a:pPr>
             <a:r>
               <a:rPr lang="en-US" altLang="ko-KR" dirty="0"/>
               <a:t>2. Both exists on Server/Local Repository</a:t>
             </a:r>
           </a:p>
           <a:p>
+            <a:pPr>
+              <a:lnSpc>
+                <a:spcPct val="150000"/>
+              </a:lnSpc>
+            </a:pPr>
             <a:r>
               <a:rPr lang="en-US" altLang="ko-KR" dirty="0"/>
               <a:t>3. A “Changes” would be the one</a:t>

</xml_diff>